<commit_message>
bug fix in the first code sample
</commit_message>
<xml_diff>
--- a/Slides.pptx
+++ b/Slides.pptx
@@ -218,7 +218,7 @@
             <a:fld id="{EE5DD191-BF68-4F80-9744-AEE2EA82C616}" type="datetimeFigureOut">
               <a:rPr lang="pt-PT" smtClean="0"/>
               <a:pPr/>
-              <a:t>02-02-2011</a:t>
+              <a:t>04-02-2011</a:t>
             </a:fld>
             <a:endParaRPr lang="pt-PT"/>
           </a:p>
@@ -571,6 +571,88 @@
 </p:notes>
 </file>
 
+<file path=ppt/notesSlides/notesSlide10.xml><?xml version="1.0" encoding="utf-8"?>
+<p:notes xmlns:a="http://schemas.openxmlformats.org/drawingml/2006/main" xmlns:r="http://schemas.openxmlformats.org/officeDocument/2006/relationships" xmlns:p="http://schemas.openxmlformats.org/presentationml/2006/main">
+  <p:cSld>
+    <p:spTree>
+      <p:nvGrpSpPr>
+        <p:cNvPr id="1" name=""/>
+        <p:cNvGrpSpPr/>
+        <p:nvPr/>
+      </p:nvGrpSpPr>
+      <p:grpSpPr>
+        <a:xfrm>
+          <a:off x="0" y="0"/>
+          <a:ext cx="0" cy="0"/>
+          <a:chOff x="0" y="0"/>
+          <a:chExt cx="0" cy="0"/>
+        </a:xfrm>
+      </p:grpSpPr>
+      <p:sp>
+        <p:nvSpPr>
+          <p:cNvPr id="2" name="Slide Image Placeholder 1"/>
+          <p:cNvSpPr>
+            <a:spLocks noGrp="1" noRot="1" noChangeAspect="1"/>
+          </p:cNvSpPr>
+          <p:nvPr>
+            <p:ph type="sldImg"/>
+          </p:nvPr>
+        </p:nvSpPr>
+        <p:spPr/>
+      </p:sp>
+      <p:sp>
+        <p:nvSpPr>
+          <p:cNvPr id="3" name="Notes Placeholder 2"/>
+          <p:cNvSpPr>
+            <a:spLocks noGrp="1"/>
+          </p:cNvSpPr>
+          <p:nvPr>
+            <p:ph type="body" idx="1"/>
+          </p:nvPr>
+        </p:nvSpPr>
+        <p:spPr/>
+        <p:txBody>
+          <a:bodyPr>
+            <a:normAutofit/>
+          </a:bodyPr>
+          <a:lstStyle/>
+          <a:p>
+            <a:endParaRPr lang="en-US" dirty="0"/>
+          </a:p>
+        </p:txBody>
+      </p:sp>
+      <p:sp>
+        <p:nvSpPr>
+          <p:cNvPr id="4" name="Slide Number Placeholder 3"/>
+          <p:cNvSpPr>
+            <a:spLocks noGrp="1"/>
+          </p:cNvSpPr>
+          <p:nvPr>
+            <p:ph type="sldNum" sz="quarter" idx="10"/>
+          </p:nvPr>
+        </p:nvSpPr>
+        <p:spPr/>
+        <p:txBody>
+          <a:bodyPr/>
+          <a:lstStyle/>
+          <a:p>
+            <a:fld id="{D25A8182-B6CA-4ED8-8A93-CABEFD09F556}" type="slidenum">
+              <a:rPr lang="pt-PT" smtClean="0"/>
+              <a:pPr/>
+              <a:t>25</a:t>
+            </a:fld>
+            <a:endParaRPr lang="pt-PT"/>
+          </a:p>
+        </p:txBody>
+      </p:sp>
+    </p:spTree>
+  </p:cSld>
+  <p:clrMapOvr>
+    <a:masterClrMapping/>
+  </p:clrMapOvr>
+</p:notes>
+</file>
+
 <file path=ppt/notesSlides/notesSlide2.xml><?xml version="1.0" encoding="utf-8"?>
 <p:notes xmlns:a="http://schemas.openxmlformats.org/drawingml/2006/main" xmlns:r="http://schemas.openxmlformats.org/officeDocument/2006/relationships" xmlns:p="http://schemas.openxmlformats.org/presentationml/2006/main">
   <p:cSld>
@@ -1132,7 +1214,7 @@
             <a:fld id="{D25A8182-B6CA-4ED8-8A93-CABEFD09F556}" type="slidenum">
               <a:rPr lang="pt-PT" smtClean="0"/>
               <a:pPr/>
-              <a:t>16</a:t>
+              <a:t>14</a:t>
             </a:fld>
             <a:endParaRPr lang="pt-PT"/>
           </a:p>
@@ -1141,7 +1223,7 @@
     </p:spTree>
     <p:extLst>
       <p:ext uri="{BB962C8B-B14F-4D97-AF65-F5344CB8AC3E}">
-        <p14:creationId xmlns:p14="http://schemas.microsoft.com/office/powerpoint/2010/main" val="1552243065"/>
+        <p14:creationId xmlns:p14="http://schemas.microsoft.com/office/powerpoint/2010/main" val="3879314581"/>
       </p:ext>
     </p:extLst>
   </p:cSld>
@@ -1192,12 +1274,10 @@
         </p:nvSpPr>
         <p:spPr/>
         <p:txBody>
-          <a:bodyPr>
-            <a:normAutofit/>
-          </a:bodyPr>
+          <a:bodyPr/>
           <a:lstStyle/>
           <a:p>
-            <a:endParaRPr lang="en-US" dirty="0"/>
+            <a:endParaRPr lang="pt-PT" dirty="0"/>
           </a:p>
         </p:txBody>
       </p:sp>
@@ -1219,13 +1299,18 @@
             <a:fld id="{D25A8182-B6CA-4ED8-8A93-CABEFD09F556}" type="slidenum">
               <a:rPr lang="pt-PT" smtClean="0"/>
               <a:pPr/>
-              <a:t>25</a:t>
+              <a:t>16</a:t>
             </a:fld>
             <a:endParaRPr lang="pt-PT"/>
           </a:p>
         </p:txBody>
       </p:sp>
     </p:spTree>
+    <p:extLst>
+      <p:ext uri="{BB962C8B-B14F-4D97-AF65-F5344CB8AC3E}">
+        <p14:creationId xmlns:p14="http://schemas.microsoft.com/office/powerpoint/2010/main" val="1552243065"/>
+      </p:ext>
+    </p:extLst>
   </p:cSld>
   <p:clrMapOvr>
     <a:masterClrMapping/>
@@ -1415,7 +1500,7 @@
             <a:fld id="{0B6325C3-942E-440F-8AE3-D61E5E637BBF}" type="datetimeFigureOut">
               <a:rPr lang="pt-PT" smtClean="0"/>
               <a:pPr/>
-              <a:t>02-02-2011</a:t>
+              <a:t>04-02-2011</a:t>
             </a:fld>
             <a:endParaRPr lang="pt-PT"/>
           </a:p>
@@ -1585,7 +1670,7 @@
             <a:fld id="{0B6325C3-942E-440F-8AE3-D61E5E637BBF}" type="datetimeFigureOut">
               <a:rPr lang="pt-PT" smtClean="0"/>
               <a:pPr/>
-              <a:t>02-02-2011</a:t>
+              <a:t>04-02-2011</a:t>
             </a:fld>
             <a:endParaRPr lang="pt-PT"/>
           </a:p>
@@ -1765,7 +1850,7 @@
             <a:fld id="{0B6325C3-942E-440F-8AE3-D61E5E637BBF}" type="datetimeFigureOut">
               <a:rPr lang="pt-PT" smtClean="0"/>
               <a:pPr/>
-              <a:t>02-02-2011</a:t>
+              <a:t>04-02-2011</a:t>
             </a:fld>
             <a:endParaRPr lang="pt-PT"/>
           </a:p>
@@ -1935,7 +2020,7 @@
             <a:fld id="{0B6325C3-942E-440F-8AE3-D61E5E637BBF}" type="datetimeFigureOut">
               <a:rPr lang="pt-PT" smtClean="0"/>
               <a:pPr/>
-              <a:t>02-02-2011</a:t>
+              <a:t>04-02-2011</a:t>
             </a:fld>
             <a:endParaRPr lang="pt-PT"/>
           </a:p>
@@ -2181,7 +2266,7 @@
             <a:fld id="{0B6325C3-942E-440F-8AE3-D61E5E637BBF}" type="datetimeFigureOut">
               <a:rPr lang="pt-PT" smtClean="0"/>
               <a:pPr/>
-              <a:t>02-02-2011</a:t>
+              <a:t>04-02-2011</a:t>
             </a:fld>
             <a:endParaRPr lang="pt-PT"/>
           </a:p>
@@ -2469,7 +2554,7 @@
             <a:fld id="{0B6325C3-942E-440F-8AE3-D61E5E637BBF}" type="datetimeFigureOut">
               <a:rPr lang="pt-PT" smtClean="0"/>
               <a:pPr/>
-              <a:t>02-02-2011</a:t>
+              <a:t>04-02-2011</a:t>
             </a:fld>
             <a:endParaRPr lang="pt-PT"/>
           </a:p>
@@ -2891,7 +2976,7 @@
             <a:fld id="{0B6325C3-942E-440F-8AE3-D61E5E637BBF}" type="datetimeFigureOut">
               <a:rPr lang="pt-PT" smtClean="0"/>
               <a:pPr/>
-              <a:t>02-02-2011</a:t>
+              <a:t>04-02-2011</a:t>
             </a:fld>
             <a:endParaRPr lang="pt-PT"/>
           </a:p>
@@ -3009,7 +3094,7 @@
             <a:fld id="{0B6325C3-942E-440F-8AE3-D61E5E637BBF}" type="datetimeFigureOut">
               <a:rPr lang="pt-PT" smtClean="0"/>
               <a:pPr/>
-              <a:t>02-02-2011</a:t>
+              <a:t>04-02-2011</a:t>
             </a:fld>
             <a:endParaRPr lang="pt-PT"/>
           </a:p>
@@ -3104,7 +3189,7 @@
             <a:fld id="{0B6325C3-942E-440F-8AE3-D61E5E637BBF}" type="datetimeFigureOut">
               <a:rPr lang="pt-PT" smtClean="0"/>
               <a:pPr/>
-              <a:t>02-02-2011</a:t>
+              <a:t>04-02-2011</a:t>
             </a:fld>
             <a:endParaRPr lang="pt-PT"/>
           </a:p>
@@ -3381,7 +3466,7 @@
             <a:fld id="{0B6325C3-942E-440F-8AE3-D61E5E637BBF}" type="datetimeFigureOut">
               <a:rPr lang="pt-PT" smtClean="0"/>
               <a:pPr/>
-              <a:t>02-02-2011</a:t>
+              <a:t>04-02-2011</a:t>
             </a:fld>
             <a:endParaRPr lang="pt-PT"/>
           </a:p>
@@ -3634,7 +3719,7 @@
             <a:fld id="{0B6325C3-942E-440F-8AE3-D61E5E637BBF}" type="datetimeFigureOut">
               <a:rPr lang="pt-PT" smtClean="0"/>
               <a:pPr/>
-              <a:t>02-02-2011</a:t>
+              <a:t>04-02-2011</a:t>
             </a:fld>
             <a:endParaRPr lang="pt-PT"/>
           </a:p>
@@ -3847,7 +3932,7 @@
             <a:fld id="{0B6325C3-942E-440F-8AE3-D61E5E637BBF}" type="datetimeFigureOut">
               <a:rPr lang="pt-PT" smtClean="0"/>
               <a:pPr/>
-              <a:t>02-02-2011</a:t>
+              <a:t>04-02-2011</a:t>
             </a:fld>
             <a:endParaRPr lang="pt-PT"/>
           </a:p>
@@ -4242,17 +4327,24 @@
         <p:spPr>
           <a:xfrm>
             <a:off x="685800" y="1340768"/>
-            <a:ext cx="7772400" cy="1470025"/>
+            <a:ext cx="7772400" cy="1872208"/>
           </a:xfrm>
         </p:spPr>
         <p:txBody>
-          <a:bodyPr/>
+          <a:bodyPr>
+            <a:normAutofit/>
+          </a:bodyPr>
           <a:lstStyle/>
           <a:p>
             <a:r>
               <a:rPr lang="pt-PT" b="1" dirty="0"/>
-              <a:t>Programação Paralela e Assíncrona na Plataforma .NET</a:t>
-            </a:r>
+              <a:t>Programação Paralela e Assíncrona na Plataforma .</a:t>
+            </a:r>
+            <a:r>
+              <a:rPr lang="pt-PT" b="1" dirty="0" smtClean="0"/>
+              <a:t>NET</a:t>
+            </a:r>
+            <a:endParaRPr lang="pt-PT" b="1" dirty="0"/>
           </a:p>
         </p:txBody>
       </p:sp>
@@ -4315,19 +4407,7 @@
               <a:rPr lang="pt-PT" sz="1400" noProof="1" smtClean="0">
                 <a:latin typeface="Arial" charset="0"/>
               </a:rPr>
-              <a:t>Duarte </a:t>
-            </a:r>
-            <a:r>
-              <a:rPr lang="pt-PT" sz="1400" noProof="1" smtClean="0">
-                <a:latin typeface="Arial" charset="0"/>
-              </a:rPr>
-              <a:t>Nunes  </a:t>
-            </a:r>
-            <a:r>
-              <a:rPr lang="pt-PT" sz="1400" noProof="1" smtClean="0">
-                <a:latin typeface="Arial" charset="0"/>
-              </a:rPr>
-              <a:t>(</a:t>
+              <a:t>Duarte Nunes  (</a:t>
             </a:r>
             <a:r>
               <a:rPr lang="pt-PT" sz="1400" u="sng" noProof="1" smtClean="0">
@@ -7915,7 +7995,7 @@
             </a:r>
             <a:r>
               <a:rPr lang="en-US" sz="3200" dirty="0" smtClean="0"/>
-              <a:t>&lt;T, </a:t>
+              <a:t>&lt;</a:t>
             </a:r>
             <a:r>
               <a:rPr lang="en-US" sz="3200" dirty="0" err="1" smtClean="0"/>
@@ -7923,7 +8003,7 @@
             </a:r>
             <a:r>
               <a:rPr lang="en-US" sz="3200" dirty="0" smtClean="0"/>
-              <a:t>&gt;[] </a:t>
+              <a:t>, T&gt;[] </a:t>
             </a:r>
             <a:r>
               <a:rPr lang="en-US" sz="3200" dirty="0" err="1" smtClean="0"/>
@@ -10024,19 +10104,7 @@
             </a:pPr>
             <a:r>
               <a:rPr lang="en-US" sz="2400" dirty="0"/>
-              <a:t>public</a:t>
-            </a:r>
-            <a:r>
-              <a:rPr lang="en-US" sz="2400" dirty="0"/>
-              <a:t> </a:t>
-            </a:r>
-            <a:r>
-              <a:rPr lang="en-US" sz="2400" dirty="0"/>
-              <a:t>static</a:t>
-            </a:r>
-            <a:r>
-              <a:rPr lang="en-US" sz="2400" dirty="0"/>
-              <a:t> </a:t>
+              <a:t>public static </a:t>
             </a:r>
             <a:r>
               <a:rPr lang="en-US" sz="2400" dirty="0" err="1"/>
@@ -22919,8 +22987,12 @@
               <a:buNone/>
             </a:pPr>
             <a:r>
+              <a:rPr lang="pt-PT" sz="2000" dirty="0" smtClean="0"/>
+              <a:t>{   ...</a:t>
+            </a:r>
+            <a:r>
               <a:rPr lang="pt-PT" sz="2000" dirty="0"/>
-              <a:t>{	      </a:t>
+              <a:t>	      </a:t>
             </a:r>
           </a:p>
           <a:p>
@@ -22963,7 +23035,11 @@
             </a:r>
             <a:r>
               <a:rPr lang="pt-PT" sz="2000" dirty="0" smtClean="0"/>
-              <a:t>                    () </a:t>
+              <a:t>                    </a:t>
+            </a:r>
+            <a:r>
+              <a:rPr lang="pt-PT" sz="2000" dirty="0" smtClean="0"/>
+              <a:t>t </a:t>
             </a:r>
             <a:r>
               <a:rPr lang="pt-PT" sz="2000" dirty="0"/>
@@ -23001,7 +23077,15 @@
             </a:pPr>
             <a:r>
               <a:rPr lang="pt-PT" sz="2000" dirty="0" smtClean="0"/>
-              <a:t>}).ContinueWith(() =&gt; { ... });</a:t>
+              <a:t>}).</a:t>
+            </a:r>
+            <a:r>
+              <a:rPr lang="pt-PT" sz="2000" dirty="0" smtClean="0"/>
+              <a:t>ContinueWith(t </a:t>
+            </a:r>
+            <a:r>
+              <a:rPr lang="pt-PT" sz="2000" dirty="0" smtClean="0"/>
+              <a:t>=&gt; { ... });</a:t>
             </a:r>
             <a:endParaRPr lang="pt-PT" sz="2000" dirty="0"/>
           </a:p>
@@ -23564,11 +23648,7 @@
           <a:p>
             <a:r>
               <a:rPr lang="pt-PT" dirty="0" smtClean="0"/>
-              <a:t>Task – </a:t>
-            </a:r>
-            <a:r>
-              <a:rPr lang="pt-PT" dirty="0" smtClean="0"/>
-              <a:t>Ciclo de Vida</a:t>
+              <a:t>Task – Ciclo de Vida</a:t>
             </a:r>
             <a:endParaRPr lang="en-US" dirty="0"/>
           </a:p>

</xml_diff>